<commit_message>
Changed where money is added
</commit_message>
<xml_diff>
--- a/Presentation.pptx
+++ b/Presentation.pptx
@@ -11,10 +11,9 @@
     <p:sldId id="259" r:id="rId5"/>
     <p:sldId id="262" r:id="rId6"/>
     <p:sldId id="261" r:id="rId7"/>
-    <p:sldId id="263" r:id="rId8"/>
-    <p:sldId id="264" r:id="rId9"/>
-    <p:sldId id="265" r:id="rId10"/>
-    <p:sldId id="260" r:id="rId11"/>
+    <p:sldId id="264" r:id="rId8"/>
+    <p:sldId id="265" r:id="rId9"/>
+    <p:sldId id="260" r:id="rId10"/>
   </p:sldIdLst>
   <p:sldSz cx="12192000" cy="6858000"/>
   <p:notesSz cx="6858000" cy="9144000"/>
@@ -113,6 +112,11 @@
       </a:defRPr>
     </a:lvl9pPr>
   </p:defaultTextStyle>
+  <p:extLst>
+    <p:ext uri="{EFAFB233-063F-42B5-8137-9DF3F51BA10A}">
+      <p15:sldGuideLst xmlns:p15="http://schemas.microsoft.com/office/powerpoint/2012/main"/>
+    </p:ext>
+  </p:extLst>
 </p:presentation>
 </file>
 
@@ -306,7 +310,7 @@
           <a:p>
             <a:fld id="{60411C13-1C42-4435-B7A6-4FF29910923C}" type="datetimeFigureOut">
               <a:rPr lang="en-US" smtClean="0"/>
-              <a:t>12/3/2017</a:t>
+              <a:t>12/10/2017</a:t>
             </a:fld>
             <a:endParaRPr lang="en-US"/>
           </a:p>
@@ -581,7 +585,7 @@
           <a:p>
             <a:fld id="{60411C13-1C42-4435-B7A6-4FF29910923C}" type="datetimeFigureOut">
               <a:rPr lang="en-US" smtClean="0"/>
-              <a:t>12/3/2017</a:t>
+              <a:t>12/10/2017</a:t>
             </a:fld>
             <a:endParaRPr lang="en-US"/>
           </a:p>
@@ -775,7 +779,7 @@
           <a:p>
             <a:fld id="{60411C13-1C42-4435-B7A6-4FF29910923C}" type="datetimeFigureOut">
               <a:rPr lang="en-US" smtClean="0"/>
-              <a:t>12/3/2017</a:t>
+              <a:t>12/10/2017</a:t>
             </a:fld>
             <a:endParaRPr lang="en-US"/>
           </a:p>
@@ -1048,7 +1052,7 @@
           <a:p>
             <a:fld id="{60411C13-1C42-4435-B7A6-4FF29910923C}" type="datetimeFigureOut">
               <a:rPr lang="en-US" smtClean="0"/>
-              <a:t>12/3/2017</a:t>
+              <a:t>12/10/2017</a:t>
             </a:fld>
             <a:endParaRPr lang="en-US"/>
           </a:p>
@@ -1389,7 +1393,7 @@
           <a:p>
             <a:fld id="{60411C13-1C42-4435-B7A6-4FF29910923C}" type="datetimeFigureOut">
               <a:rPr lang="en-US" smtClean="0"/>
-              <a:t>12/3/2017</a:t>
+              <a:t>12/10/2017</a:t>
             </a:fld>
             <a:endParaRPr lang="en-US"/>
           </a:p>
@@ -2012,7 +2016,7 @@
           <a:p>
             <a:fld id="{60411C13-1C42-4435-B7A6-4FF29910923C}" type="datetimeFigureOut">
               <a:rPr lang="en-US" smtClean="0"/>
-              <a:t>12/3/2017</a:t>
+              <a:t>12/10/2017</a:t>
             </a:fld>
             <a:endParaRPr lang="en-US"/>
           </a:p>
@@ -2872,7 +2876,7 @@
           <a:p>
             <a:fld id="{60411C13-1C42-4435-B7A6-4FF29910923C}" type="datetimeFigureOut">
               <a:rPr lang="en-US" smtClean="0"/>
-              <a:t>12/3/2017</a:t>
+              <a:t>12/10/2017</a:t>
             </a:fld>
             <a:endParaRPr lang="en-US"/>
           </a:p>
@@ -3042,7 +3046,7 @@
           <a:p>
             <a:fld id="{60411C13-1C42-4435-B7A6-4FF29910923C}" type="datetimeFigureOut">
               <a:rPr lang="en-US" smtClean="0"/>
-              <a:t>12/3/2017</a:t>
+              <a:t>12/10/2017</a:t>
             </a:fld>
             <a:endParaRPr lang="en-US"/>
           </a:p>
@@ -3222,7 +3226,7 @@
           <a:p>
             <a:fld id="{60411C13-1C42-4435-B7A6-4FF29910923C}" type="datetimeFigureOut">
               <a:rPr lang="en-US" smtClean="0"/>
-              <a:t>12/3/2017</a:t>
+              <a:t>12/10/2017</a:t>
             </a:fld>
             <a:endParaRPr lang="en-US"/>
           </a:p>
@@ -3392,7 +3396,7 @@
           <a:p>
             <a:fld id="{60411C13-1C42-4435-B7A6-4FF29910923C}" type="datetimeFigureOut">
               <a:rPr lang="en-US" smtClean="0"/>
-              <a:t>12/3/2017</a:t>
+              <a:t>12/10/2017</a:t>
             </a:fld>
             <a:endParaRPr lang="en-US"/>
           </a:p>
@@ -3639,7 +3643,7 @@
           <a:p>
             <a:fld id="{60411C13-1C42-4435-B7A6-4FF29910923C}" type="datetimeFigureOut">
               <a:rPr lang="en-US" smtClean="0"/>
-              <a:t>12/3/2017</a:t>
+              <a:t>12/10/2017</a:t>
             </a:fld>
             <a:endParaRPr lang="en-US"/>
           </a:p>
@@ -3931,7 +3935,7 @@
           <a:p>
             <a:fld id="{60411C13-1C42-4435-B7A6-4FF29910923C}" type="datetimeFigureOut">
               <a:rPr lang="en-US" smtClean="0"/>
-              <a:t>12/3/2017</a:t>
+              <a:t>12/10/2017</a:t>
             </a:fld>
             <a:endParaRPr lang="en-US"/>
           </a:p>
@@ -4375,7 +4379,7 @@
           <a:p>
             <a:fld id="{60411C13-1C42-4435-B7A6-4FF29910923C}" type="datetimeFigureOut">
               <a:rPr lang="en-US" smtClean="0"/>
-              <a:t>12/3/2017</a:t>
+              <a:t>12/10/2017</a:t>
             </a:fld>
             <a:endParaRPr lang="en-US"/>
           </a:p>
@@ -4493,7 +4497,7 @@
           <a:p>
             <a:fld id="{60411C13-1C42-4435-B7A6-4FF29910923C}" type="datetimeFigureOut">
               <a:rPr lang="en-US" smtClean="0"/>
-              <a:t>12/3/2017</a:t>
+              <a:t>12/10/2017</a:t>
             </a:fld>
             <a:endParaRPr lang="en-US"/>
           </a:p>
@@ -4588,7 +4592,7 @@
           <a:p>
             <a:fld id="{60411C13-1C42-4435-B7A6-4FF29910923C}" type="datetimeFigureOut">
               <a:rPr lang="en-US" smtClean="0"/>
-              <a:t>12/3/2017</a:t>
+              <a:t>12/10/2017</a:t>
             </a:fld>
             <a:endParaRPr lang="en-US"/>
           </a:p>
@@ -4867,7 +4871,7 @@
           <a:p>
             <a:fld id="{60411C13-1C42-4435-B7A6-4FF29910923C}" type="datetimeFigureOut">
               <a:rPr lang="en-US" smtClean="0"/>
-              <a:t>12/3/2017</a:t>
+              <a:t>12/10/2017</a:t>
             </a:fld>
             <a:endParaRPr lang="en-US"/>
           </a:p>
@@ -5142,7 +5146,7 @@
           <a:p>
             <a:fld id="{60411C13-1C42-4435-B7A6-4FF29910923C}" type="datetimeFigureOut">
               <a:rPr lang="en-US" smtClean="0"/>
-              <a:t>12/3/2017</a:t>
+              <a:t>12/10/2017</a:t>
             </a:fld>
             <a:endParaRPr lang="en-US"/>
           </a:p>
@@ -5571,7 +5575,7 @@
           <a:p>
             <a:fld id="{60411C13-1C42-4435-B7A6-4FF29910923C}" type="datetimeFigureOut">
               <a:rPr lang="en-US" smtClean="0"/>
-              <a:t>12/3/2017</a:t>
+              <a:t>12/10/2017</a:t>
             </a:fld>
             <a:endParaRPr lang="en-US"/>
           </a:p>
@@ -6165,121 +6169,6 @@
 </p:sld>
 </file>
 
-<file path=ppt/slides/slide10.xml><?xml version="1.0" encoding="utf-8"?>
-<p:sld xmlns:a="http://schemas.openxmlformats.org/drawingml/2006/main" xmlns:r="http://schemas.openxmlformats.org/officeDocument/2006/relationships" xmlns:p="http://schemas.openxmlformats.org/presentationml/2006/main">
-  <p:cSld>
-    <p:spTree>
-      <p:nvGrpSpPr>
-        <p:cNvPr id="1" name=""/>
-        <p:cNvGrpSpPr/>
-        <p:nvPr/>
-      </p:nvGrpSpPr>
-      <p:grpSpPr>
-        <a:xfrm>
-          <a:off x="0" y="0"/>
-          <a:ext cx="0" cy="0"/>
-          <a:chOff x="0" y="0"/>
-          <a:chExt cx="0" cy="0"/>
-        </a:xfrm>
-      </p:grpSpPr>
-      <p:sp>
-        <p:nvSpPr>
-          <p:cNvPr id="2" name="Title 1">
-            <a:extLst>
-              <a:ext uri="{FF2B5EF4-FFF2-40B4-BE49-F238E27FC236}">
-                <a16:creationId xmlns:a16="http://schemas.microsoft.com/office/drawing/2014/main" id="{5C127D31-2E6B-490F-A448-A0D07EA49961}"/>
-              </a:ext>
-            </a:extLst>
-          </p:cNvPr>
-          <p:cNvSpPr>
-            <a:spLocks noGrp="1"/>
-          </p:cNvSpPr>
-          <p:nvPr>
-            <p:ph type="title"/>
-          </p:nvPr>
-        </p:nvSpPr>
-        <p:spPr/>
-        <p:txBody>
-          <a:bodyPr/>
-          <a:lstStyle/>
-          <a:p>
-            <a:r>
-              <a:rPr lang="en-US" dirty="0"/>
-              <a:t>Zippy Terrain</a:t>
-            </a:r>
-          </a:p>
-        </p:txBody>
-      </p:sp>
-      <p:sp>
-        <p:nvSpPr>
-          <p:cNvPr id="3" name="Content Placeholder 2">
-            <a:extLst>
-              <a:ext uri="{FF2B5EF4-FFF2-40B4-BE49-F238E27FC236}">
-                <a16:creationId xmlns:a16="http://schemas.microsoft.com/office/drawing/2014/main" id="{A7432A6D-5F35-4DC6-B103-62CBE56F68C3}"/>
-              </a:ext>
-            </a:extLst>
-          </p:cNvPr>
-          <p:cNvSpPr>
-            <a:spLocks noGrp="1"/>
-          </p:cNvSpPr>
-          <p:nvPr>
-            <p:ph sz="half" idx="1"/>
-          </p:nvPr>
-        </p:nvSpPr>
-        <p:spPr/>
-        <p:txBody>
-          <a:bodyPr>
-            <a:normAutofit/>
-          </a:bodyPr>
-          <a:lstStyle/>
-          <a:p>
-            <a:endParaRPr lang="en-US" dirty="0"/>
-          </a:p>
-        </p:txBody>
-      </p:sp>
-      <p:pic>
-        <p:nvPicPr>
-          <p:cNvPr id="6" name="Picture 5">
-            <a:extLst>
-              <a:ext uri="{FF2B5EF4-FFF2-40B4-BE49-F238E27FC236}">
-                <a16:creationId xmlns:a16="http://schemas.microsoft.com/office/drawing/2014/main" id="{606B4B42-DDBF-4CFE-AFFF-212BE9CE46D7}"/>
-              </a:ext>
-            </a:extLst>
-          </p:cNvPr>
-          <p:cNvPicPr>
-            <a:picLocks noChangeAspect="1"/>
-          </p:cNvPicPr>
-          <p:nvPr/>
-        </p:nvPicPr>
-        <p:blipFill>
-          <a:blip r:embed="rId2"/>
-          <a:stretch>
-            <a:fillRect/>
-          </a:stretch>
-        </p:blipFill>
-        <p:spPr>
-          <a:xfrm>
-            <a:off x="5654494" y="2060575"/>
-            <a:ext cx="4396339" cy="3390900"/>
-          </a:xfrm>
-          <a:prstGeom prst="rect">
-            <a:avLst/>
-          </a:prstGeom>
-        </p:spPr>
-      </p:pic>
-    </p:spTree>
-    <p:extLst>
-      <p:ext uri="{BB962C8B-B14F-4D97-AF65-F5344CB8AC3E}">
-        <p14:creationId xmlns:p14="http://schemas.microsoft.com/office/powerpoint/2010/main" val="3801847285"/>
-      </p:ext>
-    </p:extLst>
-  </p:cSld>
-  <p:clrMapOvr>
-    <a:masterClrMapping/>
-  </p:clrMapOvr>
-</p:sld>
-</file>
-
 <file path=ppt/slides/slide2.xml><?xml version="1.0" encoding="utf-8"?>
 <p:sld xmlns:a="http://schemas.openxmlformats.org/drawingml/2006/main" xmlns:r="http://schemas.openxmlformats.org/officeDocument/2006/relationships" xmlns:p="http://schemas.openxmlformats.org/presentationml/2006/main">
   <p:cSld>
@@ -6748,7 +6637,16 @@
           </a:bodyPr>
           <a:lstStyle/>
           <a:p>
-            <a:endParaRPr lang="en-US" dirty="0"/>
+            <a:r>
+              <a:rPr lang="en-US" dirty="0"/>
+              <a:t>Scared basic troll</a:t>
+            </a:r>
+          </a:p>
+          <a:p>
+            <a:r>
+              <a:rPr lang="en-US" dirty="0"/>
+              <a:t>Will always run away or freeze up when the player gets close</a:t>
+            </a:r>
           </a:p>
         </p:txBody>
       </p:sp>
@@ -6893,7 +6791,16 @@
           </a:bodyPr>
           <a:lstStyle/>
           <a:p>
-            <a:endParaRPr lang="en-US" dirty="0"/>
+            <a:r>
+              <a:rPr lang="en-US" dirty="0"/>
+              <a:t>Can crouch and jump to dodge the player based off of the rock’s y value</a:t>
+            </a:r>
+          </a:p>
+          <a:p>
+            <a:r>
+              <a:rPr lang="en-US" dirty="0"/>
+              <a:t>Has a small chance to panic and run away from the rock</a:t>
+            </a:r>
           </a:p>
         </p:txBody>
       </p:sp>
@@ -6950,7 +6857,7 @@
           <a:p>
             <a:r>
               <a:rPr lang="en-US" dirty="0"/>
-              <a:t>Goblin Types: Chucker</a:t>
+              <a:t>Goblin Types: Bruiser</a:t>
             </a:r>
           </a:p>
         </p:txBody>
@@ -6978,122 +6885,16 @@
           </a:bodyPr>
           <a:lstStyle/>
           <a:p>
-            <a:endParaRPr lang="en-US" dirty="0"/>
-          </a:p>
-        </p:txBody>
-      </p:sp>
-      <p:pic>
-        <p:nvPicPr>
-          <p:cNvPr id="5" name="Picture 4">
-            <a:extLst>
-              <a:ext uri="{FF2B5EF4-FFF2-40B4-BE49-F238E27FC236}">
-                <a16:creationId xmlns:a16="http://schemas.microsoft.com/office/drawing/2014/main" id="{D22E78E0-AA29-4410-84E4-2BF4502AD789}"/>
-              </a:ext>
-            </a:extLst>
-          </p:cNvPr>
-          <p:cNvPicPr>
-            <a:picLocks noChangeAspect="1"/>
-          </p:cNvPicPr>
-          <p:nvPr/>
-        </p:nvPicPr>
-        <p:blipFill>
-          <a:blip r:embed="rId2"/>
-          <a:stretch>
-            <a:fillRect/>
-          </a:stretch>
-        </p:blipFill>
-        <p:spPr>
-          <a:xfrm>
-            <a:off x="6434479" y="2060575"/>
-            <a:ext cx="2836363" cy="3738842"/>
-          </a:xfrm>
-          <a:prstGeom prst="rect">
-            <a:avLst/>
-          </a:prstGeom>
-        </p:spPr>
-      </p:pic>
-    </p:spTree>
-    <p:extLst>
-      <p:ext uri="{BB962C8B-B14F-4D97-AF65-F5344CB8AC3E}">
-        <p14:creationId xmlns:p14="http://schemas.microsoft.com/office/powerpoint/2010/main" val="919146216"/>
-      </p:ext>
-    </p:extLst>
-  </p:cSld>
-  <p:clrMapOvr>
-    <a:masterClrMapping/>
-  </p:clrMapOvr>
-</p:sld>
-</file>
-
-<file path=ppt/slides/slide8.xml><?xml version="1.0" encoding="utf-8"?>
-<p:sld xmlns:a="http://schemas.openxmlformats.org/drawingml/2006/main" xmlns:r="http://schemas.openxmlformats.org/officeDocument/2006/relationships" xmlns:p="http://schemas.openxmlformats.org/presentationml/2006/main">
-  <p:cSld>
-    <p:spTree>
-      <p:nvGrpSpPr>
-        <p:cNvPr id="1" name=""/>
-        <p:cNvGrpSpPr/>
-        <p:nvPr/>
-      </p:nvGrpSpPr>
-      <p:grpSpPr>
-        <a:xfrm>
-          <a:off x="0" y="0"/>
-          <a:ext cx="0" cy="0"/>
-          <a:chOff x="0" y="0"/>
-          <a:chExt cx="0" cy="0"/>
-        </a:xfrm>
-      </p:grpSpPr>
-      <p:sp>
-        <p:nvSpPr>
-          <p:cNvPr id="2" name="Title 1">
-            <a:extLst>
-              <a:ext uri="{FF2B5EF4-FFF2-40B4-BE49-F238E27FC236}">
-                <a16:creationId xmlns:a16="http://schemas.microsoft.com/office/drawing/2014/main" id="{5C127D31-2E6B-490F-A448-A0D07EA49961}"/>
-              </a:ext>
-            </a:extLst>
-          </p:cNvPr>
-          <p:cNvSpPr>
-            <a:spLocks noGrp="1"/>
-          </p:cNvSpPr>
-          <p:nvPr>
-            <p:ph type="title"/>
-          </p:nvPr>
-        </p:nvSpPr>
-        <p:spPr/>
-        <p:txBody>
-          <a:bodyPr/>
-          <a:lstStyle/>
-          <a:p>
             <a:r>
               <a:rPr lang="en-US" dirty="0"/>
-              <a:t>Goblin Types: Bruiser</a:t>
-            </a:r>
-          </a:p>
-        </p:txBody>
-      </p:sp>
-      <p:sp>
-        <p:nvSpPr>
-          <p:cNvPr id="3" name="Content Placeholder 2">
-            <a:extLst>
-              <a:ext uri="{FF2B5EF4-FFF2-40B4-BE49-F238E27FC236}">
-                <a16:creationId xmlns:a16="http://schemas.microsoft.com/office/drawing/2014/main" id="{A7432A6D-5F35-4DC6-B103-62CBE56F68C3}"/>
-              </a:ext>
-            </a:extLst>
-          </p:cNvPr>
-          <p:cNvSpPr>
-            <a:spLocks noGrp="1"/>
-          </p:cNvSpPr>
-          <p:nvPr>
-            <p:ph sz="half" idx="1"/>
-          </p:nvPr>
-        </p:nvSpPr>
-        <p:spPr/>
-        <p:txBody>
-          <a:bodyPr>
-            <a:normAutofit/>
-          </a:bodyPr>
-          <a:lstStyle/>
-          <a:p>
-            <a:endParaRPr lang="en-US" dirty="0"/>
+              <a:t>Will usually try to attack the rock to slow it down</a:t>
+            </a:r>
+          </a:p>
+          <a:p>
+            <a:r>
+              <a:rPr lang="en-US" dirty="0"/>
+              <a:t>Has a small chance of panicking and running away from the player</a:t>
+            </a:r>
           </a:p>
         </p:txBody>
       </p:sp>
@@ -7140,7 +6941,7 @@
 </p:sld>
 </file>
 
-<file path=ppt/slides/slide9.xml><?xml version="1.0" encoding="utf-8"?>
+<file path=ppt/slides/slide8.xml><?xml version="1.0" encoding="utf-8"?>
 <p:sld xmlns:a="http://schemas.openxmlformats.org/drawingml/2006/main" xmlns:r="http://schemas.openxmlformats.org/officeDocument/2006/relationships" xmlns:p="http://schemas.openxmlformats.org/presentationml/2006/main">
   <p:cSld>
     <p:spTree>
@@ -7208,7 +7009,22 @@
           </a:bodyPr>
           <a:lstStyle/>
           <a:p>
-            <a:endParaRPr lang="en-US" dirty="0"/>
+            <a:r>
+              <a:rPr lang="en-US" dirty="0"/>
+              <a:t>Simple background enemies</a:t>
+            </a:r>
+          </a:p>
+          <a:p>
+            <a:r>
+              <a:rPr lang="en-US" dirty="0"/>
+              <a:t>They don’t actually do anything</a:t>
+            </a:r>
+          </a:p>
+          <a:p>
+            <a:r>
+              <a:rPr lang="en-US" dirty="0"/>
+              <a:t>The player can kill them by getting high enough into the air</a:t>
+            </a:r>
           </a:p>
         </p:txBody>
       </p:sp>
@@ -7235,7 +7051,7 @@
         <p:spPr>
           <a:xfrm>
             <a:off x="6434478" y="2093231"/>
-            <a:ext cx="2836362" cy="3706184"/>
+            <a:ext cx="3355474" cy="3706184"/>
           </a:xfrm>
           <a:prstGeom prst="rect">
             <a:avLst/>
@@ -7246,6 +7062,142 @@
     <p:extLst>
       <p:ext uri="{BB962C8B-B14F-4D97-AF65-F5344CB8AC3E}">
         <p14:creationId xmlns:p14="http://schemas.microsoft.com/office/powerpoint/2010/main" val="963307119"/>
+      </p:ext>
+    </p:extLst>
+  </p:cSld>
+  <p:clrMapOvr>
+    <a:masterClrMapping/>
+  </p:clrMapOvr>
+</p:sld>
+</file>
+
+<file path=ppt/slides/slide9.xml><?xml version="1.0" encoding="utf-8"?>
+<p:sld xmlns:a="http://schemas.openxmlformats.org/drawingml/2006/main" xmlns:r="http://schemas.openxmlformats.org/officeDocument/2006/relationships" xmlns:p="http://schemas.openxmlformats.org/presentationml/2006/main">
+  <p:cSld>
+    <p:spTree>
+      <p:nvGrpSpPr>
+        <p:cNvPr id="1" name=""/>
+        <p:cNvGrpSpPr/>
+        <p:nvPr/>
+      </p:nvGrpSpPr>
+      <p:grpSpPr>
+        <a:xfrm>
+          <a:off x="0" y="0"/>
+          <a:ext cx="0" cy="0"/>
+          <a:chOff x="0" y="0"/>
+          <a:chExt cx="0" cy="0"/>
+        </a:xfrm>
+      </p:grpSpPr>
+      <p:sp>
+        <p:nvSpPr>
+          <p:cNvPr id="2" name="Title 1">
+            <a:extLst>
+              <a:ext uri="{FF2B5EF4-FFF2-40B4-BE49-F238E27FC236}">
+                <a16:creationId xmlns:a16="http://schemas.microsoft.com/office/drawing/2014/main" id="{5C127D31-2E6B-490F-A448-A0D07EA49961}"/>
+              </a:ext>
+            </a:extLst>
+          </p:cNvPr>
+          <p:cNvSpPr>
+            <a:spLocks noGrp="1"/>
+          </p:cNvSpPr>
+          <p:nvPr>
+            <p:ph type="title"/>
+          </p:nvPr>
+        </p:nvSpPr>
+        <p:spPr/>
+        <p:txBody>
+          <a:bodyPr/>
+          <a:lstStyle/>
+          <a:p>
+            <a:r>
+              <a:rPr lang="en-US" dirty="0"/>
+              <a:t>Zippy Terrain</a:t>
+            </a:r>
+          </a:p>
+        </p:txBody>
+      </p:sp>
+      <p:sp>
+        <p:nvSpPr>
+          <p:cNvPr id="3" name="Content Placeholder 2">
+            <a:extLst>
+              <a:ext uri="{FF2B5EF4-FFF2-40B4-BE49-F238E27FC236}">
+                <a16:creationId xmlns:a16="http://schemas.microsoft.com/office/drawing/2014/main" id="{A7432A6D-5F35-4DC6-B103-62CBE56F68C3}"/>
+              </a:ext>
+            </a:extLst>
+          </p:cNvPr>
+          <p:cNvSpPr>
+            <a:spLocks noGrp="1"/>
+          </p:cNvSpPr>
+          <p:nvPr>
+            <p:ph sz="half" idx="1"/>
+          </p:nvPr>
+        </p:nvSpPr>
+        <p:spPr/>
+        <p:txBody>
+          <a:bodyPr>
+            <a:normAutofit/>
+          </a:bodyPr>
+          <a:lstStyle/>
+          <a:p>
+            <a:r>
+              <a:rPr lang="en-US" dirty="0"/>
+              <a:t>Generation framework</a:t>
+            </a:r>
+          </a:p>
+          <a:p>
+            <a:r>
+              <a:rPr lang="en-US" dirty="0"/>
+              <a:t>Allows the creation of landmasses based off of a curve</a:t>
+            </a:r>
+          </a:p>
+          <a:p>
+            <a:r>
+              <a:rPr lang="en-US" dirty="0"/>
+              <a:t>These landmasses could then be randomly selected and placed into the game world</a:t>
+            </a:r>
+          </a:p>
+          <a:p>
+            <a:r>
+              <a:rPr lang="en-US" dirty="0"/>
+              <a:t>This set up allowed the ball to roll endlessly while also allowing for varied landscapes</a:t>
+            </a:r>
+          </a:p>
+        </p:txBody>
+      </p:sp>
+      <p:pic>
+        <p:nvPicPr>
+          <p:cNvPr id="6" name="Picture 5">
+            <a:extLst>
+              <a:ext uri="{FF2B5EF4-FFF2-40B4-BE49-F238E27FC236}">
+                <a16:creationId xmlns:a16="http://schemas.microsoft.com/office/drawing/2014/main" id="{606B4B42-DDBF-4CFE-AFFF-212BE9CE46D7}"/>
+              </a:ext>
+            </a:extLst>
+          </p:cNvPr>
+          <p:cNvPicPr>
+            <a:picLocks noChangeAspect="1"/>
+          </p:cNvPicPr>
+          <p:nvPr/>
+        </p:nvPicPr>
+        <p:blipFill>
+          <a:blip r:embed="rId2"/>
+          <a:stretch>
+            <a:fillRect/>
+          </a:stretch>
+        </p:blipFill>
+        <p:spPr>
+          <a:xfrm>
+            <a:off x="5654494" y="2060575"/>
+            <a:ext cx="4396339" cy="3390900"/>
+          </a:xfrm>
+          <a:prstGeom prst="rect">
+            <a:avLst/>
+          </a:prstGeom>
+        </p:spPr>
+      </p:pic>
+    </p:spTree>
+    <p:extLst>
+      <p:ext uri="{BB962C8B-B14F-4D97-AF65-F5344CB8AC3E}">
+        <p14:creationId xmlns:p14="http://schemas.microsoft.com/office/powerpoint/2010/main" val="3801847285"/>
       </p:ext>
     </p:extLst>
   </p:cSld>

</xml_diff>